<commit_message>
Changes of 20th june
</commit_message>
<xml_diff>
--- a/NetAgent/src/main/resources/AgentActivity.pptx
+++ b/NetAgent/src/main/resources/AgentActivity.pptx
@@ -432,7 +432,7 @@
                 </a:solidFill>
                 <a:latin typeface="Arial"/>
               </a:rPr>
-              <a:t>6/17/2022 1:41 AM</a:t>
+              <a:t>6/19/2022 9:44 PM</a:t>
             </a:r>
           </a:p>
         </p:txBody>
@@ -680,7 +680,7 @@
         <p:spPr>
           <a:xfrm xmlns:a="http://schemas.openxmlformats.org/drawingml/2006/main">
             <a:off x="248278" y="752478"/>
-            <a:ext cx="7016054" cy="476247"/>
+            <a:ext cx="7016054" cy="1344927"/>
           </a:xfrm>
           <a:prstGeom xmlns:a="http://schemas.openxmlformats.org/drawingml/2006/main" prst="rect"/>
           <a:noFill xmlns:a="http://schemas.openxmlformats.org/drawingml/2006/main"/>
@@ -718,7 +718,7 @@
                 </a:solidFill>
                 <a:latin typeface="Arial"/>
               </a:rPr>
-              <a:t>6/17/2022 1:41 AM</a:t>
+              <a:t>6/19/2022 9:44 PM</a:t>
             </a:r>
           </a:p>
         </p:txBody>

</xml_diff>

<commit_message>
Changes of 21st June 2022 for Master screens
</commit_message>
<xml_diff>
--- a/NetAgent/src/main/resources/AgentActivity.pptx
+++ b/NetAgent/src/main/resources/AgentActivity.pptx
@@ -432,7 +432,7 @@
                 </a:solidFill>
                 <a:latin typeface="Arial"/>
               </a:rPr>
-              <a:t>6/19/2022 9:44 PM</a:t>
+              <a:t>6/21/2022 12:41 AM</a:t>
             </a:r>
           </a:p>
         </p:txBody>
@@ -718,7 +718,7 @@
                 </a:solidFill>
                 <a:latin typeface="Arial"/>
               </a:rPr>
-              <a:t>6/19/2022 9:44 PM</a:t>
+              <a:t>6/21/2022 12:41 AM</a:t>
             </a:r>
           </a:p>
         </p:txBody>

</xml_diff>